<commit_message>
Friday 2/2 lectures, OS P1
</commit_message>
<xml_diff>
--- a/OS/sp18/lectures/OSsp18_lec4_IPC.pptx
+++ b/OS/sp18/lectures/OSsp18_lec4_IPC.pptx
@@ -2868,7 +2868,7 @@
           <a:p>
             <a:fld id="{47AF30A3-B24C-EF4C-ABCD-E27881C5B4DE}" type="datetime1">
               <a:rPr lang="en-US" smtClean="0"/>
-              <a:t>1/30/18</a:t>
+              <a:t>1/31/18</a:t>
             </a:fld>
             <a:endParaRPr lang="en-US"/>
           </a:p>
@@ -3065,7 +3065,7 @@
           <a:p>
             <a:fld id="{30495D88-64DF-5C4A-9FB6-F3EA8605FB8C}" type="datetime1">
               <a:rPr lang="en-US" smtClean="0"/>
-              <a:t>1/30/18</a:t>
+              <a:t>1/31/18</a:t>
             </a:fld>
             <a:endParaRPr lang="en-US"/>
           </a:p>
@@ -3271,7 +3271,7 @@
           <a:p>
             <a:fld id="{B3D95ACD-F83C-DE48-9F14-DECEA4C75FBD}" type="datetime1">
               <a:rPr lang="en-US" smtClean="0"/>
-              <a:t>1/30/18</a:t>
+              <a:t>1/31/18</a:t>
             </a:fld>
             <a:endParaRPr lang="en-US"/>
           </a:p>
@@ -3534,7 +3534,7 @@
           <a:p>
             <a:fld id="{E6CFFC12-E53D-6D45-8245-2E7B9DCA2860}" type="datetime1">
               <a:rPr lang="en-US" smtClean="0"/>
-              <a:t>1/30/18</a:t>
+              <a:t>1/31/18</a:t>
             </a:fld>
             <a:endParaRPr lang="en-US"/>
           </a:p>
@@ -3797,7 +3797,7 @@
           <a:p>
             <a:fld id="{B9B4B0CA-5B56-464B-9C5B-7DC027D0D3FE}" type="datetime1">
               <a:rPr lang="en-US" smtClean="0"/>
-              <a:t>1/30/18</a:t>
+              <a:t>1/31/18</a:t>
             </a:fld>
             <a:endParaRPr lang="en-US"/>
           </a:p>
@@ -3993,7 +3993,7 @@
           <a:p>
             <a:fld id="{99D3DD5F-70D3-6A40-A773-ECD8020FDC02}" type="datetime1">
               <a:rPr lang="en-US" smtClean="0"/>
-              <a:t>1/30/18</a:t>
+              <a:t>1/31/18</a:t>
             </a:fld>
             <a:endParaRPr lang="en-US"/>
           </a:p>
@@ -4211,7 +4211,7 @@
           <a:p>
             <a:fld id="{D4C80B86-882C-C94E-BF93-E3C6D18CDFA5}" type="datetime1">
               <a:rPr lang="en-US" smtClean="0"/>
-              <a:t>1/30/18</a:t>
+              <a:t>1/31/18</a:t>
             </a:fld>
             <a:endParaRPr lang="en-US"/>
           </a:p>
@@ -4525,7 +4525,7 @@
           <a:p>
             <a:fld id="{3548F4CC-4303-BE4D-B1C6-768183960132}" type="datetime1">
               <a:rPr lang="en-US" smtClean="0"/>
-              <a:t>1/30/18</a:t>
+              <a:t>1/31/18</a:t>
             </a:fld>
             <a:endParaRPr lang="en-US"/>
           </a:p>
@@ -4978,7 +4978,7 @@
           <a:p>
             <a:fld id="{57DFDE30-A746-7A46-96FD-2EE31806DE4E}" type="datetime1">
               <a:rPr lang="en-US" smtClean="0"/>
-              <a:t>1/30/18</a:t>
+              <a:t>1/31/18</a:t>
             </a:fld>
             <a:endParaRPr lang="en-US"/>
           </a:p>
@@ -5122,7 +5122,7 @@
           <a:p>
             <a:fld id="{835448BA-2D76-3545-9DBD-EE3FB9888686}" type="datetime1">
               <a:rPr lang="en-US" smtClean="0"/>
-              <a:t>1/30/18</a:t>
+              <a:t>1/31/18</a:t>
             </a:fld>
             <a:endParaRPr lang="en-US"/>
           </a:p>
@@ -5243,7 +5243,7 @@
           <a:p>
             <a:fld id="{264D7355-435C-A244-A053-00BDA5B7F7AA}" type="datetime1">
               <a:rPr lang="en-US" smtClean="0"/>
-              <a:t>1/30/18</a:t>
+              <a:t>1/31/18</a:t>
             </a:fld>
             <a:endParaRPr lang="en-US"/>
           </a:p>
@@ -5546,7 +5546,7 @@
           <a:p>
             <a:fld id="{A2BF0E34-29B2-E94A-A005-DE5E5A51C282}" type="datetime1">
               <a:rPr lang="en-US" smtClean="0"/>
-              <a:t>1/30/18</a:t>
+              <a:t>1/31/18</a:t>
             </a:fld>
             <a:endParaRPr lang="en-US"/>
           </a:p>
@@ -5826,7 +5826,7 @@
           <a:p>
             <a:fld id="{E5324815-0D2B-854C-80D0-7628B1956483}" type="datetime1">
               <a:rPr lang="en-US" smtClean="0"/>
-              <a:t>1/30/18</a:t>
+              <a:t>1/31/18</a:t>
             </a:fld>
             <a:endParaRPr lang="en-US"/>
           </a:p>
@@ -6125,7 +6125,7 @@
           <a:p>
             <a:fld id="{602CC83A-16CA-3847-AE9B-D307CF640AB3}" type="datetime1">
               <a:rPr lang="en-US" smtClean="0"/>
-              <a:t>1/30/18</a:t>
+              <a:t>1/31/18</a:t>
             </a:fld>
             <a:endParaRPr lang="en-US"/>
           </a:p>
@@ -7013,7 +7013,13 @@
               <a:rPr lang="en-US" dirty="0" smtClean="0">
                 <a:latin typeface="Arial" charset="0"/>
               </a:rPr>
-              <a:t>Processes and process management (continued)</a:t>
+              <a:t>Inter-</a:t>
+            </a:r>
+            <a:r>
+              <a:rPr lang="en-US" smtClean="0">
+                <a:latin typeface="Arial" charset="0"/>
+              </a:rPr>
+              <a:t>process communication (IPC)</a:t>
             </a:r>
             <a:endParaRPr lang="en-US" dirty="0">
               <a:latin typeface="Arial" charset="0"/>
@@ -7338,7 +7344,7 @@
           <a:p>
             <a:fld id="{31011F67-60EC-9344-A5F1-CD9E7F655568}" type="datetime1">
               <a:rPr lang="en-US" smtClean="0"/>
-              <a:t>1/30/18</a:t>
+              <a:t>1/31/18</a:t>
             </a:fld>
             <a:endParaRPr lang="en-US"/>
           </a:p>
@@ -7601,7 +7607,7 @@
           <a:p>
             <a:fld id="{CFEDEB12-F1DD-C24B-B3E2-CFA0036DF793}" type="datetime1">
               <a:rPr lang="en-US" smtClean="0"/>
-              <a:t>1/30/18</a:t>
+              <a:t>1/31/18</a:t>
             </a:fld>
             <a:endParaRPr lang="en-US"/>
           </a:p>
@@ -7839,7 +7845,7 @@
           <a:p>
             <a:fld id="{17050D31-2F7D-484F-8F55-0092F4CA5BBB}" type="datetime1">
               <a:rPr lang="en-US" smtClean="0"/>
-              <a:t>1/30/18</a:t>
+              <a:t>1/31/18</a:t>
             </a:fld>
             <a:endParaRPr lang="en-US"/>
           </a:p>
@@ -8272,7 +8278,7 @@
           <a:p>
             <a:fld id="{3781C96B-23C8-104A-89A2-8BA47991DB20}" type="datetime1">
               <a:rPr lang="en-US" smtClean="0"/>
-              <a:t>1/30/18</a:t>
+              <a:t>1/31/18</a:t>
             </a:fld>
             <a:endParaRPr lang="en-US"/>
           </a:p>
@@ -8542,7 +8548,7 @@
           <a:p>
             <a:fld id="{1C44BB61-C579-D54E-A18B-2F30F5A7274D}" type="datetime1">
               <a:rPr lang="en-US" smtClean="0"/>
-              <a:t>1/30/18</a:t>
+              <a:t>1/31/18</a:t>
             </a:fld>
             <a:endParaRPr lang="en-US"/>
           </a:p>
@@ -8768,7 +8774,7 @@
           <a:p>
             <a:fld id="{0333AE50-8B63-1441-81FB-1BA8F1C51E03}" type="datetime1">
               <a:rPr lang="en-US" smtClean="0"/>
-              <a:t>1/30/18</a:t>
+              <a:t>1/31/18</a:t>
             </a:fld>
             <a:endParaRPr lang="en-US"/>
           </a:p>
@@ -9046,7 +9052,7 @@
           <a:p>
             <a:fld id="{1493ED00-11FE-F941-895F-57B43139F629}" type="datetime1">
               <a:rPr lang="en-US" smtClean="0"/>
-              <a:t>1/30/18</a:t>
+              <a:t>1/31/18</a:t>
             </a:fld>
             <a:endParaRPr lang="en-US"/>
           </a:p>
@@ -9391,7 +9397,7 @@
           <a:p>
             <a:fld id="{7FC40DFC-EF73-5944-B6D3-A6EE7489C376}" type="datetime1">
               <a:rPr lang="en-US" smtClean="0"/>
-              <a:t>1/30/18</a:t>
+              <a:t>1/31/18</a:t>
             </a:fld>
             <a:endParaRPr lang="en-US"/>
           </a:p>
@@ -9681,7 +9687,7 @@
           <a:p>
             <a:fld id="{8E94111D-A91B-174E-92F1-C7A56821F53F}" type="datetime1">
               <a:rPr lang="en-US" smtClean="0"/>
-              <a:t>1/30/18</a:t>
+              <a:t>1/31/18</a:t>
             </a:fld>
             <a:endParaRPr lang="en-US"/>
           </a:p>
@@ -10079,7 +10085,7 @@
           <a:p>
             <a:fld id="{6469D460-867E-D14F-B1D6-B87996938DF4}" type="datetime1">
               <a:rPr lang="en-US" smtClean="0"/>
-              <a:t>1/30/18</a:t>
+              <a:t>1/31/18</a:t>
             </a:fld>
             <a:endParaRPr lang="en-US"/>
           </a:p>
@@ -10428,7 +10434,7 @@
                 <a:latin typeface="Garamond"/>
                 <a:cs typeface="Garamond"/>
               </a:rPr>
-              <a:t>1/30/18</a:t>
+              <a:t>1/31/18</a:t>
             </a:fld>
             <a:endParaRPr lang="en-US" dirty="0">
               <a:latin typeface="Garamond"/>
@@ -10866,7 +10872,7 @@
           <a:p>
             <a:fld id="{D7A5EDE0-F5A3-6C4A-9A7D-930B4734B736}" type="datetime1">
               <a:rPr lang="en-US" smtClean="0"/>
-              <a:t>1/30/18</a:t>
+              <a:t>1/31/18</a:t>
             </a:fld>
             <a:endParaRPr lang="en-US"/>
           </a:p>
@@ -11051,7 +11057,7 @@
           <a:p>
             <a:fld id="{D2CF7F89-CF93-9443-ABB5-3491EA97F6FF}" type="datetime1">
               <a:rPr lang="en-US" smtClean="0"/>
-              <a:t>1/30/18</a:t>
+              <a:t>1/31/18</a:t>
             </a:fld>
             <a:endParaRPr lang="en-US"/>
           </a:p>
@@ -11378,7 +11384,7 @@
           <a:p>
             <a:fld id="{1C04F64D-3C20-E348-B99A-9B6B277756F4}" type="datetime1">
               <a:rPr lang="en-US" smtClean="0"/>
-              <a:t>1/30/18</a:t>
+              <a:t>1/31/18</a:t>
             </a:fld>
             <a:endParaRPr lang="en-US"/>
           </a:p>
@@ -11667,6 +11673,21 @@
               <a:rPr lang="en-US" dirty="0" smtClean="0"/>
               <a:t>, EECS 482 lecture notes, University of Michigan, Fall 2016</a:t>
             </a:r>
+          </a:p>
+          <a:p>
+            <a:r>
+              <a:rPr lang="en-US" dirty="0" smtClean="0"/>
+              <a:t>Example </a:t>
+            </a:r>
+            <a:r>
+              <a:rPr lang="en-US" smtClean="0"/>
+              <a:t>code was downloaded from:</a:t>
+            </a:r>
+          </a:p>
+          <a:p>
+            <a:pPr marL="0" indent="0">
+              <a:buNone/>
+            </a:pPr>
             <a:endParaRPr lang="en-US" dirty="0"/>
           </a:p>
         </p:txBody>
@@ -11688,7 +11709,7 @@
           <a:p>
             <a:fld id="{8185757A-2A4A-E148-83D4-949DE24A9C5B}" type="datetime1">
               <a:rPr lang="en-US" smtClean="0"/>
-              <a:t>1/30/18</a:t>
+              <a:t>1/31/18</a:t>
             </a:fld>
             <a:endParaRPr lang="en-US"/>
           </a:p>
@@ -11956,7 +11977,7 @@
           <a:p>
             <a:fld id="{CF3579E8-AEA6-194E-A861-48D16C7C1DCF}" type="datetime1">
               <a:rPr lang="en-US" smtClean="0"/>
-              <a:t>1/30/18</a:t>
+              <a:t>1/31/18</a:t>
             </a:fld>
             <a:endParaRPr lang="en-US"/>
           </a:p>
@@ -12239,7 +12260,7 @@
           <a:p>
             <a:fld id="{51E3604D-9C57-0249-9144-19646AC424D7}" type="datetime1">
               <a:rPr lang="en-US" smtClean="0"/>
-              <a:t>1/30/18</a:t>
+              <a:t>1/31/18</a:t>
             </a:fld>
             <a:endParaRPr lang="en-US"/>
           </a:p>
@@ -12462,7 +12483,7 @@
           <a:p>
             <a:fld id="{4E636C85-44FE-B941-BCB8-A2CA6EAF0230}" type="datetime1">
               <a:rPr lang="en-US" smtClean="0"/>
-              <a:t>1/30/18</a:t>
+              <a:t>1/31/18</a:t>
             </a:fld>
             <a:endParaRPr lang="en-US"/>
           </a:p>
@@ -12743,7 +12764,7 @@
           <a:p>
             <a:fld id="{DD67821D-29CB-7F4F-9FCD-41C07838F251}" type="datetime1">
               <a:rPr lang="en-US" smtClean="0"/>
-              <a:t>1/30/18</a:t>
+              <a:t>1/31/18</a:t>
             </a:fld>
             <a:endParaRPr lang="en-US"/>
           </a:p>
@@ -13012,7 +13033,7 @@
           <a:p>
             <a:fld id="{3B9C3947-58CD-744D-A498-9E94CAC6E7EA}" type="datetime1">
               <a:rPr lang="en-US" smtClean="0"/>
-              <a:t>1/30/18</a:t>
+              <a:t>1/31/18</a:t>
             </a:fld>
             <a:endParaRPr lang="en-US"/>
           </a:p>
@@ -13231,7 +13252,7 @@
           <a:p>
             <a:fld id="{4A4CEF5F-B1A2-6E48-8800-BC3C4DAA6039}" type="datetime1">
               <a:rPr lang="en-US" smtClean="0"/>
-              <a:t>1/30/18</a:t>
+              <a:t>1/31/18</a:t>
             </a:fld>
             <a:endParaRPr lang="en-US"/>
           </a:p>
@@ -13508,7 +13529,7 @@
           <a:p>
             <a:fld id="{0C43E656-E67F-254E-9415-574C94A50924}" type="datetime1">
               <a:rPr lang="en-US" smtClean="0"/>
-              <a:t>1/30/18</a:t>
+              <a:t>1/31/18</a:t>
             </a:fld>
             <a:endParaRPr lang="en-US"/>
           </a:p>

</xml_diff>